<commit_message>
Adicionei novos comandos git
</commit_message>
<xml_diff>
--- a/Aula02- 13-08-2021.pptx
+++ b/Aula02- 13-08-2021.pptx
@@ -5,7 +5,7 @@
     <p:sldMasterId id="2147483648" r:id="rId1"/>
   </p:sldMasterIdLst>
   <p:notesMasterIdLst>
-    <p:notesMasterId r:id="rId26"/>
+    <p:notesMasterId r:id="rId28"/>
   </p:notesMasterIdLst>
   <p:sldIdLst>
     <p:sldId id="256" r:id="rId2"/>
@@ -26,29 +26,31 @@
     <p:sldId id="287" r:id="rId17"/>
     <p:sldId id="306" r:id="rId18"/>
     <p:sldId id="307" r:id="rId19"/>
-    <p:sldId id="308" r:id="rId20"/>
-    <p:sldId id="305" r:id="rId21"/>
-    <p:sldId id="309" r:id="rId22"/>
-    <p:sldId id="288" r:id="rId23"/>
-    <p:sldId id="310" r:id="rId24"/>
-    <p:sldId id="289" r:id="rId25"/>
+    <p:sldId id="309" r:id="rId20"/>
+    <p:sldId id="311" r:id="rId21"/>
+    <p:sldId id="308" r:id="rId22"/>
+    <p:sldId id="305" r:id="rId23"/>
+    <p:sldId id="312" r:id="rId24"/>
+    <p:sldId id="288" r:id="rId25"/>
+    <p:sldId id="310" r:id="rId26"/>
+    <p:sldId id="289" r:id="rId27"/>
   </p:sldIdLst>
   <p:sldSz cx="9144000" cy="5143500" type="screen16x9"/>
   <p:notesSz cx="6858000" cy="9144000"/>
   <p:embeddedFontLst>
     <p:embeddedFont>
       <p:font typeface="Roboto" panose="02000000000000000000" pitchFamily="2" charset="0"/>
-      <p:regular r:id="rId27"/>
-      <p:bold r:id="rId28"/>
-      <p:italic r:id="rId29"/>
-      <p:boldItalic r:id="rId30"/>
+      <p:regular r:id="rId29"/>
+      <p:bold r:id="rId30"/>
+      <p:italic r:id="rId31"/>
+      <p:boldItalic r:id="rId32"/>
     </p:embeddedFont>
     <p:embeddedFont>
       <p:font typeface="Roboto Light" panose="02000000000000000000" pitchFamily="2" charset="0"/>
-      <p:regular r:id="rId31"/>
-      <p:bold r:id="rId32"/>
-      <p:italic r:id="rId33"/>
-      <p:boldItalic r:id="rId34"/>
+      <p:regular r:id="rId33"/>
+      <p:bold r:id="rId34"/>
+      <p:italic r:id="rId35"/>
+      <p:boldItalic r:id="rId36"/>
     </p:embeddedFont>
   </p:embeddedFontLst>
   <p:defaultTextStyle>
@@ -296,7 +298,7 @@
       </p15:sldGuideLst>
     </p:ext>
     <p:ext uri="http://customooxmlschemas.google.com/">
-      <go:slidesCustomData xmlns="" xmlns:mc="http://schemas.openxmlformats.org/markup-compatibility/2006" xmlns:mv="urn:schemas-microsoft-com:mac:vml" xmlns:c="http://schemas.openxmlformats.org/drawingml/2006/chart" xmlns:dgm="http://schemas.openxmlformats.org/drawingml/2006/diagram" xmlns:o="urn:schemas-microsoft-com:office:office" xmlns:v="urn:schemas-microsoft-com:vml" xmlns:pvml="urn:schemas-microsoft-com:office:powerpoint" xmlns:com="http://schemas.openxmlformats.org/drawingml/2006/compatibility" xmlns:p14="http://schemas.microsoft.com/office/powerpoint/2010/main" xmlns:p15="http://schemas.microsoft.com/office/powerpoint/2012/main" xmlns:ahyp="http://schemas.microsoft.com/office/drawing/2018/hyperlinkcolor" xmlns:go="http://customooxmlschemas.google.com/" r:id="rId45" roundtripDataSignature="AMtx7mgJW7a1RJkstcebUx5qU+HcIQrglQ=="/>
+      <go:slidesCustomData xmlns:go="http://customooxmlschemas.google.com/" xmlns:ahyp="http://schemas.microsoft.com/office/drawing/2018/hyperlinkcolor" xmlns:p15="http://schemas.microsoft.com/office/powerpoint/2012/main" xmlns:p14="http://schemas.microsoft.com/office/powerpoint/2010/main" xmlns:com="http://schemas.openxmlformats.org/drawingml/2006/compatibility" xmlns:pvml="urn:schemas-microsoft-com:office:powerpoint" xmlns:v="urn:schemas-microsoft-com:vml" xmlns:o="urn:schemas-microsoft-com:office:office" xmlns:dgm="http://schemas.openxmlformats.org/drawingml/2006/diagram" xmlns:c="http://schemas.openxmlformats.org/drawingml/2006/chart" xmlns:mv="urn:schemas-microsoft-com:mac:vml" xmlns:mc="http://schemas.openxmlformats.org/markup-compatibility/2006" xmlns="" r:id="rId45" roundtripDataSignature="AMtx7mgJW7a1RJkstcebUx5qU+HcIQrglQ=="/>
     </p:ext>
   </p:extLst>
 </p:presentation>
@@ -12396,7 +12398,7 @@
           <a:p>
             <a:r>
               <a:rPr lang="pt-BR" dirty="0"/>
-              <a:t>Média de 2 números</a:t>
+              <a:t>Média de 3 números</a:t>
             </a:r>
           </a:p>
         </p:txBody>
@@ -13292,8 +13294,8 @@
         </p:blipFill>
         <p:spPr>
           <a:xfrm>
-            <a:off x="4915089" y="0"/>
-            <a:ext cx="4282373" cy="2754261"/>
+            <a:off x="3774971" y="863550"/>
+            <a:ext cx="5311878" cy="3416400"/>
           </a:xfrm>
           <a:prstGeom prst="rect">
             <a:avLst/>
@@ -13335,7 +13337,7 @@
           <p:cNvPr id="2" name="Título 1">
             <a:extLst>
               <a:ext uri="{FF2B5EF4-FFF2-40B4-BE49-F238E27FC236}">
-                <a16:creationId xmlns:a16="http://schemas.microsoft.com/office/drawing/2014/main" id="{23B153CA-0946-47AB-B032-8B345D2B4F9C}"/>
+                <a16:creationId xmlns:a16="http://schemas.microsoft.com/office/drawing/2014/main" id="{6E8499F2-A782-499D-95C3-0196CC09D688}"/>
               </a:ext>
             </a:extLst>
           </p:cNvPr>
@@ -13346,14 +13348,19 @@
             <p:ph type="title"/>
           </p:nvPr>
         </p:nvSpPr>
-        <p:spPr/>
+        <p:spPr>
+          <a:xfrm>
+            <a:off x="579634" y="61567"/>
+            <a:ext cx="8171700" cy="572700"/>
+          </a:xfrm>
+        </p:spPr>
         <p:txBody>
           <a:bodyPr/>
           <a:lstStyle/>
           <a:p>
             <a:r>
               <a:rPr lang="pt-BR" dirty="0"/>
-              <a:t>Algoritmo que mostre a média de 3 notas</a:t>
+              <a:t>Algoritmo que dê boas vindas</a:t>
             </a:r>
           </a:p>
         </p:txBody>
@@ -13363,7 +13370,7 @@
           <p:cNvPr id="3" name="Espaço Reservado para Texto 2">
             <a:extLst>
               <a:ext uri="{FF2B5EF4-FFF2-40B4-BE49-F238E27FC236}">
-                <a16:creationId xmlns:a16="http://schemas.microsoft.com/office/drawing/2014/main" id="{92DB23B0-5BB8-40ED-B272-572057A84663}"/>
+                <a16:creationId xmlns:a16="http://schemas.microsoft.com/office/drawing/2014/main" id="{26D9477A-F55D-404D-970B-757BF74FD910}"/>
               </a:ext>
             </a:extLst>
           </p:cNvPr>
@@ -13376,7 +13383,7 @@
         </p:nvSpPr>
         <p:spPr>
           <a:xfrm>
-            <a:off x="57151" y="1211468"/>
+            <a:off x="392666" y="582734"/>
             <a:ext cx="8171700" cy="3416400"/>
           </a:xfrm>
         </p:spPr>
@@ -13389,7 +13396,7 @@
             </a:pPr>
             <a:r>
               <a:rPr lang="pt-BR" dirty="0"/>
-              <a:t>Nota1 = 8.5;</a:t>
+              <a:t>Leia(nome);</a:t>
             </a:r>
           </a:p>
           <a:p>
@@ -13398,34 +13405,7 @@
             </a:pPr>
             <a:r>
               <a:rPr lang="pt-BR" dirty="0"/>
-              <a:t>Nota2 = 9.5;</a:t>
-            </a:r>
-          </a:p>
-          <a:p>
-            <a:pPr marL="114300" indent="0">
-              <a:buNone/>
-            </a:pPr>
-            <a:r>
-              <a:rPr lang="pt-BR" dirty="0"/>
-              <a:t>Nota3 = 10.0;</a:t>
-            </a:r>
-          </a:p>
-          <a:p>
-            <a:pPr marL="114300" indent="0">
-              <a:buNone/>
-            </a:pPr>
-            <a:r>
-              <a:rPr lang="pt-BR" dirty="0"/>
-              <a:t>Media = (Nota1 + Nota2 + Nota3) / 3;</a:t>
-            </a:r>
-          </a:p>
-          <a:p>
-            <a:pPr marL="114300" indent="0">
-              <a:buNone/>
-            </a:pPr>
-            <a:r>
-              <a:rPr lang="pt-BR" dirty="0"/>
-              <a:t>Escreva(&lt;media&gt;);</a:t>
+              <a:t>Escreva(“Seja Bem Vindo” + nome);</a:t>
             </a:r>
           </a:p>
           <a:p>
@@ -13440,12 +13420,59 @@
             </a:pPr>
             <a:endParaRPr lang="pt-BR" dirty="0"/>
           </a:p>
+          <a:p>
+            <a:pPr marL="114300" indent="0">
+              <a:buNone/>
+            </a:pPr>
+            <a:endParaRPr lang="pt-BR" dirty="0"/>
+          </a:p>
+          <a:p>
+            <a:pPr marL="114300" indent="0">
+              <a:buNone/>
+            </a:pPr>
+            <a:endParaRPr lang="pt-BR" dirty="0"/>
+          </a:p>
+          <a:p>
+            <a:pPr marL="114300" indent="0">
+              <a:buNone/>
+            </a:pPr>
+            <a:endParaRPr lang="pt-BR" dirty="0"/>
+          </a:p>
         </p:txBody>
       </p:sp>
+      <p:pic>
+        <p:nvPicPr>
+          <p:cNvPr id="5" name="Imagem 4" descr="Interface gráfica do usuário, Aplicativo&#10;&#10;Descrição gerada automaticamente">
+            <a:extLst>
+              <a:ext uri="{FF2B5EF4-FFF2-40B4-BE49-F238E27FC236}">
+                <a16:creationId xmlns:a16="http://schemas.microsoft.com/office/drawing/2014/main" id="{0C778C0E-E9D2-40A6-8D18-01E0A3E8A8CC}"/>
+              </a:ext>
+            </a:extLst>
+          </p:cNvPr>
+          <p:cNvPicPr>
+            <a:picLocks noChangeAspect="1"/>
+          </p:cNvPicPr>
+          <p:nvPr/>
+        </p:nvPicPr>
+        <p:blipFill rotWithShape="1">
+          <a:blip r:embed="rId2"/>
+          <a:srcRect b="11656"/>
+          <a:stretch/>
+        </p:blipFill>
+        <p:spPr>
+          <a:xfrm>
+            <a:off x="3009900" y="1712099"/>
+            <a:ext cx="6134100" cy="3416400"/>
+          </a:xfrm>
+          <a:prstGeom prst="rect">
+            <a:avLst/>
+          </a:prstGeom>
+        </p:spPr>
+      </p:pic>
     </p:spTree>
     <p:extLst>
       <p:ext uri="{BB962C8B-B14F-4D97-AF65-F5344CB8AC3E}">
-        <p14:creationId xmlns:p14="http://schemas.microsoft.com/office/powerpoint/2010/main" val="4258784956"/>
+        <p14:creationId xmlns:p14="http://schemas.microsoft.com/office/powerpoint/2010/main" val="746219612"/>
       </p:ext>
     </p:extLst>
   </p:cSld>
@@ -13654,7 +13681,7 @@
           <p:cNvPr id="2" name="Título 1">
             <a:extLst>
               <a:ext uri="{FF2B5EF4-FFF2-40B4-BE49-F238E27FC236}">
-                <a16:creationId xmlns:a16="http://schemas.microsoft.com/office/drawing/2014/main" id="{9F1559F3-4802-40AB-9B2B-7AA1A9089387}"/>
+                <a16:creationId xmlns:a16="http://schemas.microsoft.com/office/drawing/2014/main" id="{23B153CA-0946-47AB-B032-8B345D2B4F9C}"/>
               </a:ext>
             </a:extLst>
           </p:cNvPr>
@@ -13672,7 +13699,7 @@
           <a:p>
             <a:r>
               <a:rPr lang="pt-BR" dirty="0"/>
-              <a:t>Comandos de entrada</a:t>
+              <a:t>Algoritmo que mostre a média de 3 notas</a:t>
             </a:r>
           </a:p>
         </p:txBody>
@@ -13682,7 +13709,7 @@
           <p:cNvPr id="3" name="Espaço Reservado para Texto 2">
             <a:extLst>
               <a:ext uri="{FF2B5EF4-FFF2-40B4-BE49-F238E27FC236}">
-                <a16:creationId xmlns:a16="http://schemas.microsoft.com/office/drawing/2014/main" id="{B7F67177-A25A-47AD-9F86-1A95F09AFC66}"/>
+                <a16:creationId xmlns:a16="http://schemas.microsoft.com/office/drawing/2014/main" id="{92DB23B0-5BB8-40ED-B272-572057A84663}"/>
               </a:ext>
             </a:extLst>
           </p:cNvPr>
@@ -13693,14 +13720,58 @@
             <p:ph type="body" idx="1"/>
           </p:nvPr>
         </p:nvSpPr>
-        <p:spPr/>
+        <p:spPr>
+          <a:xfrm>
+            <a:off x="57151" y="1211468"/>
+            <a:ext cx="8171700" cy="3416400"/>
+          </a:xfrm>
+        </p:spPr>
         <p:txBody>
           <a:bodyPr/>
           <a:lstStyle/>
           <a:p>
+            <a:pPr marL="114300" indent="0">
+              <a:buNone/>
+            </a:pPr>
             <a:r>
               <a:rPr lang="pt-BR" dirty="0"/>
-              <a:t>Serve para enviar os dados do usuário para o computador.</a:t>
+              <a:t>Nota1 = 8;</a:t>
+            </a:r>
+          </a:p>
+          <a:p>
+            <a:pPr marL="114300" indent="0">
+              <a:buNone/>
+            </a:pPr>
+            <a:r>
+              <a:rPr lang="pt-BR" dirty="0"/>
+              <a:t>Nota2 = 9;</a:t>
+            </a:r>
+          </a:p>
+          <a:p>
+            <a:pPr marL="114300" indent="0">
+              <a:buNone/>
+            </a:pPr>
+            <a:r>
+              <a:rPr lang="pt-BR" dirty="0"/>
+              <a:t>Nota3 = 10;</a:t>
+            </a:r>
+          </a:p>
+          <a:p>
+            <a:pPr marL="114300" indent="0">
+              <a:buNone/>
+            </a:pPr>
+            <a:r>
+              <a:rPr lang="pt-BR" dirty="0"/>
+              <a:t>Media = (Nota1 + Nota2 + Nota3) / 3;</a:t>
+            </a:r>
+          </a:p>
+          <a:p>
+            <a:pPr marL="114300" indent="0">
+              <a:buNone/>
+            </a:pPr>
+            <a:r>
+              <a:rPr lang="pt-BR" dirty="0"/>
+              <a:t>Escreva(&lt;media&gt;);</a:t>
             </a:r>
           </a:p>
           <a:p>
@@ -13713,85 +13784,14 @@
             <a:pPr marL="114300" indent="0">
               <a:buNone/>
             </a:pPr>
-            <a:r>
-              <a:rPr lang="pt-BR" dirty="0"/>
-              <a:t>Exemplos: </a:t>
-            </a:r>
-          </a:p>
-          <a:p>
-            <a:pPr marL="114300" indent="0">
-              <a:buNone/>
-            </a:pPr>
-            <a:r>
-              <a:rPr lang="pt-BR" dirty="0"/>
-              <a:t>Digitar um texto, clicar em um botão..</a:t>
-            </a:r>
-          </a:p>
-          <a:p>
-            <a:pPr marL="114300" indent="0">
-              <a:buNone/>
-            </a:pPr>
             <a:endParaRPr lang="pt-BR" dirty="0"/>
-          </a:p>
-          <a:p>
-            <a:pPr marL="114300" indent="0">
-              <a:buNone/>
-            </a:pPr>
-            <a:r>
-              <a:rPr lang="pt-BR" dirty="0"/>
-              <a:t>Sintaxe:</a:t>
-            </a:r>
-          </a:p>
-          <a:p>
-            <a:pPr marL="114300" indent="0">
-              <a:buNone/>
-            </a:pPr>
-            <a:r>
-              <a:rPr lang="pt-BR" dirty="0"/>
-              <a:t>Leia(&lt;</a:t>
-            </a:r>
-            <a:r>
-              <a:rPr lang="pt-BR" dirty="0">
-                <a:solidFill>
-                  <a:srgbClr val="FF0000"/>
-                </a:solidFill>
-              </a:rPr>
-              <a:t>variável</a:t>
-            </a:r>
-            <a:r>
-              <a:rPr lang="pt-BR" dirty="0"/>
-              <a:t>&gt;);</a:t>
-            </a:r>
-          </a:p>
-          <a:p>
-            <a:pPr marL="114300" indent="0">
-              <a:buNone/>
-            </a:pPr>
-            <a:endParaRPr lang="pt-BR" dirty="0"/>
-          </a:p>
-          <a:p>
-            <a:pPr marL="114300" indent="0">
-              <a:buNone/>
-            </a:pPr>
-            <a:r>
-              <a:rPr lang="pt-BR" dirty="0"/>
-              <a:t>Exemplo: </a:t>
-            </a:r>
-            <a:r>
-              <a:rPr lang="pt-BR" dirty="0" err="1"/>
-              <a:t>Console.ReadLine</a:t>
-            </a:r>
-            <a:r>
-              <a:rPr lang="pt-BR" dirty="0"/>
-              <a:t>();</a:t>
-            </a:r>
           </a:p>
         </p:txBody>
       </p:sp>
     </p:spTree>
     <p:extLst>
       <p:ext uri="{BB962C8B-B14F-4D97-AF65-F5344CB8AC3E}">
-        <p14:creationId xmlns:p14="http://schemas.microsoft.com/office/powerpoint/2010/main" val="3079513082"/>
+        <p14:creationId xmlns:p14="http://schemas.microsoft.com/office/powerpoint/2010/main" val="455546923"/>
       </p:ext>
     </p:extLst>
   </p:cSld>
@@ -13823,7 +13823,7 @@
           <p:cNvPr id="2" name="Título 1">
             <a:extLst>
               <a:ext uri="{FF2B5EF4-FFF2-40B4-BE49-F238E27FC236}">
-                <a16:creationId xmlns:a16="http://schemas.microsoft.com/office/drawing/2014/main" id="{6E8499F2-A782-499D-95C3-0196CC09D688}"/>
+                <a16:creationId xmlns:a16="http://schemas.microsoft.com/office/drawing/2014/main" id="{23B153CA-0946-47AB-B032-8B345D2B4F9C}"/>
               </a:ext>
             </a:extLst>
           </p:cNvPr>
@@ -13834,19 +13834,14 @@
             <p:ph type="title"/>
           </p:nvPr>
         </p:nvSpPr>
-        <p:spPr>
-          <a:xfrm>
-            <a:off x="579634" y="61567"/>
-            <a:ext cx="8171700" cy="572700"/>
-          </a:xfrm>
-        </p:spPr>
+        <p:spPr/>
         <p:txBody>
           <a:bodyPr/>
           <a:lstStyle/>
           <a:p>
             <a:r>
               <a:rPr lang="pt-BR" dirty="0"/>
-              <a:t>Algoritmo que dê boas vindas</a:t>
+              <a:t>Algoritmo que mostre a média de 3 notas</a:t>
             </a:r>
           </a:p>
         </p:txBody>
@@ -13856,7 +13851,7 @@
           <p:cNvPr id="3" name="Espaço Reservado para Texto 2">
             <a:extLst>
               <a:ext uri="{FF2B5EF4-FFF2-40B4-BE49-F238E27FC236}">
-                <a16:creationId xmlns:a16="http://schemas.microsoft.com/office/drawing/2014/main" id="{26D9477A-F55D-404D-970B-757BF74FD910}"/>
+                <a16:creationId xmlns:a16="http://schemas.microsoft.com/office/drawing/2014/main" id="{92DB23B0-5BB8-40ED-B272-572057A84663}"/>
               </a:ext>
             </a:extLst>
           </p:cNvPr>
@@ -13869,7 +13864,7 @@
         </p:nvSpPr>
         <p:spPr>
           <a:xfrm>
-            <a:off x="392666" y="582734"/>
+            <a:off x="57151" y="1211468"/>
             <a:ext cx="8171700" cy="3416400"/>
           </a:xfrm>
         </p:spPr>
@@ -13882,7 +13877,7 @@
             </a:pPr>
             <a:r>
               <a:rPr lang="pt-BR" dirty="0"/>
-              <a:t>Leia(nome);</a:t>
+              <a:t>Nota1 = 8.5;</a:t>
             </a:r>
           </a:p>
           <a:p>
@@ -13891,7 +13886,34 @@
             </a:pPr>
             <a:r>
               <a:rPr lang="pt-BR" dirty="0"/>
-              <a:t>Escreva(“Seja Bem Vindo” + nome);</a:t>
+              <a:t>Nota2 = 9.5;</a:t>
+            </a:r>
+          </a:p>
+          <a:p>
+            <a:pPr marL="114300" indent="0">
+              <a:buNone/>
+            </a:pPr>
+            <a:r>
+              <a:rPr lang="pt-BR" dirty="0"/>
+              <a:t>Nota3 = 10.0;</a:t>
+            </a:r>
+          </a:p>
+          <a:p>
+            <a:pPr marL="114300" indent="0">
+              <a:buNone/>
+            </a:pPr>
+            <a:r>
+              <a:rPr lang="pt-BR" dirty="0"/>
+              <a:t>Media = (Nota1 + Nota2 + Nota3) / 3;</a:t>
+            </a:r>
+          </a:p>
+          <a:p>
+            <a:pPr marL="114300" indent="0">
+              <a:buNone/>
+            </a:pPr>
+            <a:r>
+              <a:rPr lang="pt-BR" dirty="0"/>
+              <a:t>Escreva(&lt;media&gt;);</a:t>
             </a:r>
           </a:p>
           <a:p>
@@ -13906,59 +13928,12 @@
             </a:pPr>
             <a:endParaRPr lang="pt-BR" dirty="0"/>
           </a:p>
-          <a:p>
-            <a:pPr marL="114300" indent="0">
-              <a:buNone/>
-            </a:pPr>
-            <a:endParaRPr lang="pt-BR" dirty="0"/>
-          </a:p>
-          <a:p>
-            <a:pPr marL="114300" indent="0">
-              <a:buNone/>
-            </a:pPr>
-            <a:endParaRPr lang="pt-BR" dirty="0"/>
-          </a:p>
-          <a:p>
-            <a:pPr marL="114300" indent="0">
-              <a:buNone/>
-            </a:pPr>
-            <a:endParaRPr lang="pt-BR" dirty="0"/>
-          </a:p>
         </p:txBody>
       </p:sp>
-      <p:pic>
-        <p:nvPicPr>
-          <p:cNvPr id="5" name="Imagem 4" descr="Interface gráfica do usuário, Aplicativo&#10;&#10;Descrição gerada automaticamente">
-            <a:extLst>
-              <a:ext uri="{FF2B5EF4-FFF2-40B4-BE49-F238E27FC236}">
-                <a16:creationId xmlns:a16="http://schemas.microsoft.com/office/drawing/2014/main" id="{0C778C0E-E9D2-40A6-8D18-01E0A3E8A8CC}"/>
-              </a:ext>
-            </a:extLst>
-          </p:cNvPr>
-          <p:cNvPicPr>
-            <a:picLocks noChangeAspect="1"/>
-          </p:cNvPicPr>
-          <p:nvPr/>
-        </p:nvPicPr>
-        <p:blipFill rotWithShape="1">
-          <a:blip r:embed="rId2"/>
-          <a:srcRect b="11656"/>
-          <a:stretch/>
-        </p:blipFill>
-        <p:spPr>
-          <a:xfrm>
-            <a:off x="3009900" y="1712099"/>
-            <a:ext cx="6134100" cy="3416400"/>
-          </a:xfrm>
-          <a:prstGeom prst="rect">
-            <a:avLst/>
-          </a:prstGeom>
-        </p:spPr>
-      </p:pic>
     </p:spTree>
     <p:extLst>
       <p:ext uri="{BB962C8B-B14F-4D97-AF65-F5344CB8AC3E}">
-        <p14:creationId xmlns:p14="http://schemas.microsoft.com/office/powerpoint/2010/main" val="746219612"/>
+        <p14:creationId xmlns:p14="http://schemas.microsoft.com/office/powerpoint/2010/main" val="4258784956"/>
       </p:ext>
     </p:extLst>
   </p:cSld>
@@ -13969,6 +13944,357 @@
 </file>
 
 <file path=ppt/slides/slide22.xml><?xml version="1.0" encoding="utf-8"?>
+<p:sld xmlns:a="http://schemas.openxmlformats.org/drawingml/2006/main" xmlns:r="http://schemas.openxmlformats.org/officeDocument/2006/relationships" xmlns:p="http://schemas.openxmlformats.org/presentationml/2006/main">
+  <p:cSld>
+    <p:spTree>
+      <p:nvGrpSpPr>
+        <p:cNvPr id="1" name=""/>
+        <p:cNvGrpSpPr/>
+        <p:nvPr/>
+      </p:nvGrpSpPr>
+      <p:grpSpPr>
+        <a:xfrm>
+          <a:off x="0" y="0"/>
+          <a:ext cx="0" cy="0"/>
+          <a:chOff x="0" y="0"/>
+          <a:chExt cx="0" cy="0"/>
+        </a:xfrm>
+      </p:grpSpPr>
+      <p:sp>
+        <p:nvSpPr>
+          <p:cNvPr id="2" name="Título 1">
+            <a:extLst>
+              <a:ext uri="{FF2B5EF4-FFF2-40B4-BE49-F238E27FC236}">
+                <a16:creationId xmlns:a16="http://schemas.microsoft.com/office/drawing/2014/main" id="{9F1559F3-4802-40AB-9B2B-7AA1A9089387}"/>
+              </a:ext>
+            </a:extLst>
+          </p:cNvPr>
+          <p:cNvSpPr>
+            <a:spLocks noGrp="1"/>
+          </p:cNvSpPr>
+          <p:nvPr>
+            <p:ph type="title"/>
+          </p:nvPr>
+        </p:nvSpPr>
+        <p:spPr/>
+        <p:txBody>
+          <a:bodyPr/>
+          <a:lstStyle/>
+          <a:p>
+            <a:r>
+              <a:rPr lang="pt-BR" dirty="0"/>
+              <a:t>Comandos de entrada</a:t>
+            </a:r>
+          </a:p>
+        </p:txBody>
+      </p:sp>
+      <p:sp>
+        <p:nvSpPr>
+          <p:cNvPr id="3" name="Espaço Reservado para Texto 2">
+            <a:extLst>
+              <a:ext uri="{FF2B5EF4-FFF2-40B4-BE49-F238E27FC236}">
+                <a16:creationId xmlns:a16="http://schemas.microsoft.com/office/drawing/2014/main" id="{B7F67177-A25A-47AD-9F86-1A95F09AFC66}"/>
+              </a:ext>
+            </a:extLst>
+          </p:cNvPr>
+          <p:cNvSpPr>
+            <a:spLocks noGrp="1"/>
+          </p:cNvSpPr>
+          <p:nvPr>
+            <p:ph type="body" idx="1"/>
+          </p:nvPr>
+        </p:nvSpPr>
+        <p:spPr/>
+        <p:txBody>
+          <a:bodyPr/>
+          <a:lstStyle/>
+          <a:p>
+            <a:r>
+              <a:rPr lang="pt-BR" dirty="0"/>
+              <a:t>Serve para enviar os dados do usuário para o computador.</a:t>
+            </a:r>
+          </a:p>
+          <a:p>
+            <a:pPr marL="114300" indent="0">
+              <a:buNone/>
+            </a:pPr>
+            <a:endParaRPr lang="pt-BR" dirty="0"/>
+          </a:p>
+          <a:p>
+            <a:pPr marL="114300" indent="0">
+              <a:buNone/>
+            </a:pPr>
+            <a:r>
+              <a:rPr lang="pt-BR" dirty="0"/>
+              <a:t>Exemplos: </a:t>
+            </a:r>
+          </a:p>
+          <a:p>
+            <a:pPr marL="114300" indent="0">
+              <a:buNone/>
+            </a:pPr>
+            <a:r>
+              <a:rPr lang="pt-BR" dirty="0"/>
+              <a:t>Digitar um texto, clicar em um botão..</a:t>
+            </a:r>
+          </a:p>
+          <a:p>
+            <a:pPr marL="114300" indent="0">
+              <a:buNone/>
+            </a:pPr>
+            <a:endParaRPr lang="pt-BR" dirty="0"/>
+          </a:p>
+          <a:p>
+            <a:pPr marL="114300" indent="0">
+              <a:buNone/>
+            </a:pPr>
+            <a:r>
+              <a:rPr lang="pt-BR" dirty="0"/>
+              <a:t>Sintaxe:</a:t>
+            </a:r>
+          </a:p>
+          <a:p>
+            <a:pPr marL="114300" indent="0">
+              <a:buNone/>
+            </a:pPr>
+            <a:r>
+              <a:rPr lang="pt-BR" dirty="0"/>
+              <a:t>Leia(</a:t>
+            </a:r>
+            <a:r>
+              <a:rPr lang="pt-BR" dirty="0">
+                <a:solidFill>
+                  <a:srgbClr val="FF0000"/>
+                </a:solidFill>
+              </a:rPr>
+              <a:t>variável</a:t>
+            </a:r>
+            <a:r>
+              <a:rPr lang="pt-BR" dirty="0"/>
+              <a:t>);</a:t>
+            </a:r>
+          </a:p>
+          <a:p>
+            <a:pPr marL="114300" indent="0">
+              <a:buNone/>
+            </a:pPr>
+            <a:endParaRPr lang="pt-BR" dirty="0"/>
+          </a:p>
+          <a:p>
+            <a:pPr marL="114300" indent="0">
+              <a:buNone/>
+            </a:pPr>
+            <a:r>
+              <a:rPr lang="pt-BR" dirty="0"/>
+              <a:t>Exemplo: </a:t>
+            </a:r>
+            <a:r>
+              <a:rPr lang="pt-BR" dirty="0" err="1"/>
+              <a:t>Console.ReadLine</a:t>
+            </a:r>
+            <a:r>
+              <a:rPr lang="pt-BR" dirty="0"/>
+              <a:t>();</a:t>
+            </a:r>
+          </a:p>
+        </p:txBody>
+      </p:sp>
+    </p:spTree>
+    <p:extLst>
+      <p:ext uri="{BB962C8B-B14F-4D97-AF65-F5344CB8AC3E}">
+        <p14:creationId xmlns:p14="http://schemas.microsoft.com/office/powerpoint/2010/main" val="3079513082"/>
+      </p:ext>
+    </p:extLst>
+  </p:cSld>
+  <p:clrMapOvr>
+    <a:masterClrMapping/>
+  </p:clrMapOvr>
+</p:sld>
+</file>
+
+<file path=ppt/slides/slide23.xml><?xml version="1.0" encoding="utf-8"?>
+<p:sld xmlns:a="http://schemas.openxmlformats.org/drawingml/2006/main" xmlns:r="http://schemas.openxmlformats.org/officeDocument/2006/relationships" xmlns:p="http://schemas.openxmlformats.org/presentationml/2006/main">
+  <p:cSld>
+    <p:spTree>
+      <p:nvGrpSpPr>
+        <p:cNvPr id="1" name=""/>
+        <p:cNvGrpSpPr/>
+        <p:nvPr/>
+      </p:nvGrpSpPr>
+      <p:grpSpPr>
+        <a:xfrm>
+          <a:off x="0" y="0"/>
+          <a:ext cx="0" cy="0"/>
+          <a:chOff x="0" y="0"/>
+          <a:chExt cx="0" cy="0"/>
+        </a:xfrm>
+      </p:grpSpPr>
+      <p:sp>
+        <p:nvSpPr>
+          <p:cNvPr id="2" name="Título 1">
+            <a:extLst>
+              <a:ext uri="{FF2B5EF4-FFF2-40B4-BE49-F238E27FC236}">
+                <a16:creationId xmlns:a16="http://schemas.microsoft.com/office/drawing/2014/main" id="{A48A3CDC-CC41-4EF6-8F4A-1D49799CC5C9}"/>
+              </a:ext>
+            </a:extLst>
+          </p:cNvPr>
+          <p:cNvSpPr>
+            <a:spLocks noGrp="1"/>
+          </p:cNvSpPr>
+          <p:nvPr>
+            <p:ph type="title"/>
+          </p:nvPr>
+        </p:nvSpPr>
+        <p:spPr/>
+        <p:txBody>
+          <a:bodyPr/>
+          <a:lstStyle/>
+          <a:p>
+            <a:r>
+              <a:rPr lang="pt-BR" dirty="0"/>
+              <a:t>Comandos para autenticar o </a:t>
+            </a:r>
+            <a:r>
+              <a:rPr lang="pt-BR" dirty="0" err="1"/>
+              <a:t>git</a:t>
+            </a:r>
+            <a:r>
+              <a:rPr lang="pt-BR" dirty="0"/>
+              <a:t> em uma maquina nova</a:t>
+            </a:r>
+          </a:p>
+        </p:txBody>
+      </p:sp>
+      <p:sp>
+        <p:nvSpPr>
+          <p:cNvPr id="3" name="Espaço Reservado para Texto 2">
+            <a:extLst>
+              <a:ext uri="{FF2B5EF4-FFF2-40B4-BE49-F238E27FC236}">
+                <a16:creationId xmlns:a16="http://schemas.microsoft.com/office/drawing/2014/main" id="{DB33A62B-D529-4036-A9F7-C31445C83EA8}"/>
+              </a:ext>
+            </a:extLst>
+          </p:cNvPr>
+          <p:cNvSpPr>
+            <a:spLocks noGrp="1"/>
+          </p:cNvSpPr>
+          <p:nvPr>
+            <p:ph type="body" idx="1"/>
+          </p:nvPr>
+        </p:nvSpPr>
+        <p:spPr>
+          <a:xfrm>
+            <a:off x="660750" y="1172795"/>
+            <a:ext cx="8171700" cy="3416400"/>
+          </a:xfrm>
+        </p:spPr>
+        <p:txBody>
+          <a:bodyPr/>
+          <a:lstStyle/>
+          <a:p>
+            <a:pPr marL="114300" indent="0">
+              <a:buNone/>
+            </a:pPr>
+            <a:r>
+              <a:rPr lang="pt-BR" dirty="0" err="1"/>
+              <a:t>Git</a:t>
+            </a:r>
+            <a:r>
+              <a:rPr lang="pt-BR" dirty="0"/>
+              <a:t> </a:t>
+            </a:r>
+            <a:r>
+              <a:rPr lang="pt-BR" dirty="0" err="1"/>
+              <a:t>config</a:t>
+            </a:r>
+            <a:r>
+              <a:rPr lang="pt-BR" dirty="0"/>
+              <a:t> user.name = “seu nome”</a:t>
+            </a:r>
+          </a:p>
+          <a:p>
+            <a:pPr marL="114300" indent="0">
+              <a:buNone/>
+            </a:pPr>
+            <a:r>
+              <a:rPr lang="pt-BR" dirty="0" err="1"/>
+              <a:t>Git</a:t>
+            </a:r>
+            <a:r>
+              <a:rPr lang="pt-BR" dirty="0"/>
+              <a:t> </a:t>
+            </a:r>
+            <a:r>
+              <a:rPr lang="pt-BR" dirty="0" err="1"/>
+              <a:t>config</a:t>
+            </a:r>
+            <a:r>
+              <a:rPr lang="pt-BR" dirty="0"/>
+              <a:t> </a:t>
+            </a:r>
+            <a:r>
+              <a:rPr lang="pt-BR" dirty="0" err="1"/>
+              <a:t>user.email</a:t>
+            </a:r>
+            <a:r>
+              <a:rPr lang="pt-BR" dirty="0"/>
+              <a:t> = “seu </a:t>
+            </a:r>
+            <a:r>
+              <a:rPr lang="pt-BR" dirty="0" err="1"/>
+              <a:t>email</a:t>
+            </a:r>
+            <a:r>
+              <a:rPr lang="pt-BR" dirty="0"/>
+              <a:t> no </a:t>
+            </a:r>
+            <a:r>
+              <a:rPr lang="pt-BR" dirty="0" err="1"/>
+              <a:t>github</a:t>
+            </a:r>
+            <a:r>
+              <a:rPr lang="pt-BR" dirty="0"/>
+              <a:t>”</a:t>
+            </a:r>
+          </a:p>
+          <a:p>
+            <a:pPr marL="114300" indent="0">
+              <a:buNone/>
+            </a:pPr>
+            <a:endParaRPr lang="pt-BR" dirty="0"/>
+          </a:p>
+          <a:p>
+            <a:pPr marL="114300" indent="0">
+              <a:buNone/>
+            </a:pPr>
+            <a:r>
+              <a:rPr lang="pt-BR" dirty="0"/>
+              <a:t>Utilize quando for máquina nova para adicionar o seu usuário do </a:t>
+            </a:r>
+            <a:r>
+              <a:rPr lang="pt-BR" dirty="0" err="1"/>
+              <a:t>git</a:t>
+            </a:r>
+            <a:r>
+              <a:rPr lang="pt-BR" dirty="0"/>
+              <a:t> nas configurações do computador.</a:t>
+            </a:r>
+          </a:p>
+        </p:txBody>
+      </p:sp>
+    </p:spTree>
+    <p:extLst>
+      <p:ext uri="{BB962C8B-B14F-4D97-AF65-F5344CB8AC3E}">
+        <p14:creationId xmlns:p14="http://schemas.microsoft.com/office/powerpoint/2010/main" val="2295567457"/>
+      </p:ext>
+    </p:extLst>
+  </p:cSld>
+  <p:clrMapOvr>
+    <a:masterClrMapping/>
+  </p:clrMapOvr>
+</p:sld>
+</file>
+
+<file path=ppt/slides/slide24.xml><?xml version="1.0" encoding="utf-8"?>
 <p:sld xmlns:a="http://schemas.openxmlformats.org/drawingml/2006/main" xmlns:r="http://schemas.openxmlformats.org/officeDocument/2006/relationships" xmlns:p="http://schemas.openxmlformats.org/presentationml/2006/main">
   <p:cSld>
     <p:spTree>
@@ -14148,19 +14474,6 @@
               <a:rPr lang="pt-BR" dirty="0"/>
               <a:t> </a:t>
             </a:r>
-            <a:r>
-              <a:rPr lang="pt-BR" dirty="0" err="1"/>
-              <a:t>origin</a:t>
-            </a:r>
-            <a:r>
-              <a:rPr lang="pt-BR" dirty="0"/>
-              <a:t> </a:t>
-            </a:r>
-            <a:r>
-              <a:rPr lang="pt-BR" dirty="0" err="1"/>
-              <a:t>main</a:t>
-            </a:r>
-            <a:endParaRPr lang="pt-BR" dirty="0"/>
           </a:p>
           <a:p>
             <a:pPr marL="114300" indent="0">
@@ -14191,7 +14504,7 @@
 </p:sld>
 </file>
 
-<file path=ppt/slides/slide23.xml><?xml version="1.0" encoding="utf-8"?>
+<file path=ppt/slides/slide25.xml><?xml version="1.0" encoding="utf-8"?>
 <p:sld xmlns:a="http://schemas.openxmlformats.org/drawingml/2006/main" xmlns:r="http://schemas.openxmlformats.org/officeDocument/2006/relationships" xmlns:p="http://schemas.openxmlformats.org/presentationml/2006/main">
   <p:cSld>
     <p:spTree>
@@ -14292,7 +14605,7 @@
 </p:sld>
 </file>
 
-<file path=ppt/slides/slide24.xml><?xml version="1.0" encoding="utf-8"?>
+<file path=ppt/slides/slide26.xml><?xml version="1.0" encoding="utf-8"?>
 <p:sld xmlns:a="http://schemas.openxmlformats.org/drawingml/2006/main" xmlns:r="http://schemas.openxmlformats.org/officeDocument/2006/relationships" xmlns:p="http://schemas.openxmlformats.org/presentationml/2006/main">
   <p:cSld>
     <p:spTree>

</xml_diff>